<commit_message>
ultime sistemazioni ppt e script
</commit_message>
<xml_diff>
--- a/Presentazione_digital_marketing.pptx
+++ b/Presentazione_digital_marketing.pptx
@@ -1188,7 +1188,11 @@
     </dgm:pt>
     <dgm:pt modelId="{59EE8103-47A9-FA42-82C7-7162A2D7E012}">
       <dgm:prSet/>
-      <dgm:spPr/>
+      <dgm:spPr>
+        <a:solidFill>
+          <a:schemeClr val="accent3"/>
+        </a:solidFill>
+      </dgm:spPr>
       <dgm:t>
         <a:bodyPr/>
         <a:lstStyle/>
@@ -1473,12 +1477,7 @@
           <a:avLst/>
         </a:prstGeom>
         <a:solidFill>
-          <a:schemeClr val="accent3">
-            <a:hueOff val="0"/>
-            <a:satOff val="0"/>
-            <a:lumOff val="0"/>
-            <a:alphaOff val="0"/>
-          </a:schemeClr>
+          <a:schemeClr val="accent3"/>
         </a:solidFill>
         <a:ln w="12700" cap="flat" cmpd="sng" algn="ctr">
           <a:solidFill>
@@ -3182,7 +3181,7 @@
           <a:p>
             <a:fld id="{3D6FC354-5D41-5F46-84EE-566149A64AB3}" type="datetimeFigureOut">
               <a:rPr lang="it-IT" smtClean="0"/>
-              <a:t>16/08/21</a:t>
+              <a:t>17/08/21</a:t>
             </a:fld>
             <a:endParaRPr lang="it-IT"/>
           </a:p>
@@ -3757,7 +3756,7 @@
           <a:p>
             <a:fld id="{3F7E5583-3B1A-EB47-95D3-30714A2ABF4C}" type="datetimeFigureOut">
               <a:rPr lang="it-IT" smtClean="0"/>
-              <a:t>16/08/21</a:t>
+              <a:t>17/08/21</a:t>
             </a:fld>
             <a:endParaRPr lang="it-IT"/>
           </a:p>
@@ -3955,7 +3954,7 @@
           <a:p>
             <a:fld id="{3F7E5583-3B1A-EB47-95D3-30714A2ABF4C}" type="datetimeFigureOut">
               <a:rPr lang="it-IT" smtClean="0"/>
-              <a:t>16/08/21</a:t>
+              <a:t>17/08/21</a:t>
             </a:fld>
             <a:endParaRPr lang="it-IT"/>
           </a:p>
@@ -4163,7 +4162,7 @@
           <a:p>
             <a:fld id="{3F7E5583-3B1A-EB47-95D3-30714A2ABF4C}" type="datetimeFigureOut">
               <a:rPr lang="it-IT" smtClean="0"/>
-              <a:t>16/08/21</a:t>
+              <a:t>17/08/21</a:t>
             </a:fld>
             <a:endParaRPr lang="it-IT"/>
           </a:p>
@@ -4361,7 +4360,7 @@
           <a:p>
             <a:fld id="{3F7E5583-3B1A-EB47-95D3-30714A2ABF4C}" type="datetimeFigureOut">
               <a:rPr lang="it-IT" smtClean="0"/>
-              <a:t>16/08/21</a:t>
+              <a:t>17/08/21</a:t>
             </a:fld>
             <a:endParaRPr lang="it-IT"/>
           </a:p>
@@ -4636,7 +4635,7 @@
           <a:p>
             <a:fld id="{3F7E5583-3B1A-EB47-95D3-30714A2ABF4C}" type="datetimeFigureOut">
               <a:rPr lang="it-IT" smtClean="0"/>
-              <a:t>16/08/21</a:t>
+              <a:t>17/08/21</a:t>
             </a:fld>
             <a:endParaRPr lang="it-IT"/>
           </a:p>
@@ -4901,7 +4900,7 @@
           <a:p>
             <a:fld id="{3F7E5583-3B1A-EB47-95D3-30714A2ABF4C}" type="datetimeFigureOut">
               <a:rPr lang="it-IT" smtClean="0"/>
-              <a:t>16/08/21</a:t>
+              <a:t>17/08/21</a:t>
             </a:fld>
             <a:endParaRPr lang="it-IT"/>
           </a:p>
@@ -5313,7 +5312,7 @@
           <a:p>
             <a:fld id="{3F7E5583-3B1A-EB47-95D3-30714A2ABF4C}" type="datetimeFigureOut">
               <a:rPr lang="it-IT" smtClean="0"/>
-              <a:t>16/08/21</a:t>
+              <a:t>17/08/21</a:t>
             </a:fld>
             <a:endParaRPr lang="it-IT"/>
           </a:p>
@@ -5454,7 +5453,7 @@
           <a:p>
             <a:fld id="{3F7E5583-3B1A-EB47-95D3-30714A2ABF4C}" type="datetimeFigureOut">
               <a:rPr lang="it-IT" smtClean="0"/>
-              <a:t>16/08/21</a:t>
+              <a:t>17/08/21</a:t>
             </a:fld>
             <a:endParaRPr lang="it-IT"/>
           </a:p>
@@ -5567,7 +5566,7 @@
           <a:p>
             <a:fld id="{3F7E5583-3B1A-EB47-95D3-30714A2ABF4C}" type="datetimeFigureOut">
               <a:rPr lang="it-IT" smtClean="0"/>
-              <a:t>16/08/21</a:t>
+              <a:t>17/08/21</a:t>
             </a:fld>
             <a:endParaRPr lang="it-IT"/>
           </a:p>
@@ -5878,7 +5877,7 @@
           <a:p>
             <a:fld id="{3F7E5583-3B1A-EB47-95D3-30714A2ABF4C}" type="datetimeFigureOut">
               <a:rPr lang="it-IT" smtClean="0"/>
-              <a:t>16/08/21</a:t>
+              <a:t>17/08/21</a:t>
             </a:fld>
             <a:endParaRPr lang="it-IT"/>
           </a:p>
@@ -6166,7 +6165,7 @@
           <a:p>
             <a:fld id="{3F7E5583-3B1A-EB47-95D3-30714A2ABF4C}" type="datetimeFigureOut">
               <a:rPr lang="it-IT" smtClean="0"/>
-              <a:t>16/08/21</a:t>
+              <a:t>17/08/21</a:t>
             </a:fld>
             <a:endParaRPr lang="it-IT"/>
           </a:p>
@@ -6407,7 +6406,7 @@
           <a:p>
             <a:fld id="{3F7E5583-3B1A-EB47-95D3-30714A2ABF4C}" type="datetimeFigureOut">
               <a:rPr lang="it-IT" smtClean="0"/>
-              <a:t>16/08/21</a:t>
+              <a:t>17/08/21</a:t>
             </a:fld>
             <a:endParaRPr lang="it-IT"/>
           </a:p>
@@ -7811,7 +7810,7 @@
         </p:nvSpPr>
         <p:spPr>
           <a:xfrm>
-            <a:off x="9005456" y="1805628"/>
+            <a:off x="9107056" y="1500828"/>
             <a:ext cx="2268686" cy="369332"/>
           </a:xfrm>
           <a:prstGeom prst="rect">
@@ -7872,7 +7871,7 @@
         </p:nvSpPr>
         <p:spPr>
           <a:xfrm>
-            <a:off x="9005456" y="2451322"/>
+            <a:off x="9107056" y="2146522"/>
             <a:ext cx="2784144" cy="1384995"/>
           </a:xfrm>
           <a:prstGeom prst="rect">
@@ -8000,7 +7999,7 @@
         </p:nvSpPr>
         <p:spPr>
           <a:xfrm>
-            <a:off x="4961657" y="1482463"/>
+            <a:off x="5063257" y="1177663"/>
             <a:ext cx="2268686" cy="646331"/>
           </a:xfrm>
           <a:prstGeom prst="rect">
@@ -8061,7 +8060,7 @@
         </p:nvSpPr>
         <p:spPr>
           <a:xfrm>
-            <a:off x="4961657" y="2451322"/>
+            <a:off x="5063257" y="2146522"/>
             <a:ext cx="2784144" cy="1384995"/>
           </a:xfrm>
           <a:prstGeom prst="rect">
@@ -8170,7 +8169,7 @@
         </p:nvSpPr>
         <p:spPr>
           <a:xfrm>
-            <a:off x="1049069" y="1482463"/>
+            <a:off x="1150669" y="1177663"/>
             <a:ext cx="2137475" cy="646331"/>
           </a:xfrm>
           <a:prstGeom prst="rect">
@@ -8260,7 +8259,7 @@
         </p:blipFill>
         <p:spPr>
           <a:xfrm>
-            <a:off x="19503" y="2415328"/>
+            <a:off x="121103" y="2110528"/>
             <a:ext cx="4130795" cy="2569153"/>
           </a:xfrm>
           <a:prstGeom prst="rect">
@@ -8282,7 +8281,7 @@
         </p:nvSpPr>
         <p:spPr>
           <a:xfrm>
-            <a:off x="1366154" y="5209297"/>
+            <a:off x="1467754" y="4904497"/>
             <a:ext cx="2784144" cy="984885"/>
           </a:xfrm>
           <a:prstGeom prst="rect">
@@ -8341,7 +8340,7 @@
         </p:nvSpPr>
         <p:spPr>
           <a:xfrm>
-            <a:off x="1703240" y="4010427"/>
+            <a:off x="1804840" y="3705627"/>
             <a:ext cx="197708" cy="288504"/>
           </a:xfrm>
           <a:prstGeom prst="rect">
@@ -8394,7 +8393,7 @@
         </p:nvCxnSpPr>
         <p:spPr>
           <a:xfrm>
-            <a:off x="1703240" y="4360592"/>
+            <a:off x="1804840" y="4055792"/>
             <a:ext cx="0" cy="848705"/>
           </a:xfrm>
           <a:prstGeom prst="straightConnector1">
@@ -8474,7 +8473,7 @@
         </p:blipFill>
         <p:spPr>
           <a:xfrm>
-            <a:off x="133210" y="2227169"/>
+            <a:off x="133210" y="1769969"/>
             <a:ext cx="6104283" cy="3805518"/>
           </a:xfrm>
           <a:prstGeom prst="rect">
@@ -8910,8 +8909,8 @@
         </p:nvSpPr>
         <p:spPr>
           <a:xfrm>
-            <a:off x="3381802" y="1389908"/>
-            <a:ext cx="2012681" cy="923330"/>
+            <a:off x="1512808" y="1299996"/>
+            <a:ext cx="3933983" cy="369332"/>
           </a:xfrm>
           <a:prstGeom prst="rect">
             <a:avLst/>
@@ -8972,7 +8971,7 @@
         </p:nvGrpSpPr>
         <p:grpSpPr>
           <a:xfrm>
-            <a:off x="6181661" y="1941862"/>
+            <a:off x="6181661" y="1484662"/>
             <a:ext cx="969858" cy="725674"/>
             <a:chOff x="4768325" y="2163475"/>
             <a:chExt cx="59700" cy="46725"/>
@@ -9147,8 +9146,8 @@
         </p:nvSpPr>
         <p:spPr>
           <a:xfrm>
-            <a:off x="9777690" y="1658368"/>
-            <a:ext cx="2012681" cy="646331"/>
+            <a:off x="9008195" y="1299996"/>
+            <a:ext cx="2844800" cy="369332"/>
           </a:xfrm>
           <a:prstGeom prst="rect">
             <a:avLst/>
@@ -9219,13 +9218,13 @@
           <p:nvPr>
             <p:extLst>
               <p:ext uri="{D42A27DB-BD31-4B8C-83A1-F6EECF244321}">
-                <p14:modId xmlns:p14="http://schemas.microsoft.com/office/powerpoint/2010/main" val="1751773664"/>
+                <p14:modId xmlns:p14="http://schemas.microsoft.com/office/powerpoint/2010/main" val="214106968"/>
               </p:ext>
             </p:extLst>
           </p:nvPr>
         </p:nvGraphicFramePr>
         <p:xfrm>
-          <a:off x="7664285" y="2585575"/>
+          <a:off x="7664285" y="2128375"/>
           <a:ext cx="4226810" cy="2103120"/>
         </p:xfrm>
         <a:graphic>
@@ -10443,6 +10442,12 @@
           <a:p>
             <a:r>
               <a:rPr lang="it-IT" sz="1400" b="1" dirty="0">
+                <a:solidFill>
+                  <a:schemeClr val="tx1">
+                    <a:lumMod val="65000"/>
+                    <a:lumOff val="35000"/>
+                  </a:schemeClr>
+                </a:solidFill>
                 <a:latin typeface="Century Gothic" panose="020B0502020202020204" pitchFamily="34" charset="0"/>
               </a:rPr>
               <a:t>Real Time Marketing</a:t>
@@ -10489,7 +10494,7 @@
                 </a:solidFill>
                 <a:latin typeface="Century Gothic" panose="020B0502020202020204" pitchFamily="34" charset="0"/>
               </a:rPr>
-              <a:t>Consiste nel reagire in modo tempestivo agli stimoli dell’ambiente esterno in modo tale da ottenere visibilità e conquistare nuovi clienti</a:t>
+              <a:t>Reagire in modo tempestivo agli stimoli dell’ambiente esterno in modo tale da ottenere visibilità e conquistare nuovi clienti</a:t>
             </a:r>
           </a:p>
         </p:txBody>
@@ -11043,6 +11048,12 @@
           <a:p>
             <a:r>
               <a:rPr lang="it-IT" sz="1400" b="1" dirty="0">
+                <a:solidFill>
+                  <a:schemeClr val="tx1">
+                    <a:lumMod val="65000"/>
+                    <a:lumOff val="35000"/>
+                  </a:schemeClr>
+                </a:solidFill>
                 <a:latin typeface="Century Gothic" panose="020B0502020202020204" pitchFamily="34" charset="0"/>
               </a:rPr>
               <a:t>Multi-channel strategy </a:t>
@@ -11080,6 +11091,12 @@
           <a:p>
             <a:r>
               <a:rPr lang="it-IT" sz="1400" b="1" dirty="0">
+                <a:solidFill>
+                  <a:schemeClr val="tx1">
+                    <a:lumMod val="65000"/>
+                    <a:lumOff val="35000"/>
+                  </a:schemeClr>
+                </a:solidFill>
                 <a:latin typeface="Century Gothic" panose="020B0502020202020204" pitchFamily="34" charset="0"/>
               </a:rPr>
               <a:t>Buyer personas</a:t>
@@ -11117,6 +11134,12 @@
           <a:p>
             <a:r>
               <a:rPr lang="it-IT" sz="1400" b="1" dirty="0">
+                <a:solidFill>
+                  <a:schemeClr val="tx1">
+                    <a:lumMod val="65000"/>
+                    <a:lumOff val="35000"/>
+                  </a:schemeClr>
+                </a:solidFill>
                 <a:latin typeface="Century Gothic" panose="020B0502020202020204" pitchFamily="34" charset="0"/>
               </a:rPr>
               <a:t>CRM</a:t>
@@ -12278,7 +12301,7 @@
                 </a:solidFill>
                 <a:latin typeface="Century Gothic" panose="020B0502020202020204" pitchFamily="34" charset="0"/>
               </a:rPr>
-              <a:t>Consiste nell’utilizzare molteplici canali di comunicazione per raggiungere i clienti</a:t>
+              <a:t>Utilizzare molteplici canali di comunicazione per raggiungere i clienti</a:t>
             </a:r>
           </a:p>
         </p:txBody>
@@ -12322,7 +12345,7 @@
                 </a:solidFill>
                 <a:latin typeface="Century Gothic" panose="020B0502020202020204" pitchFamily="34" charset="0"/>
               </a:rPr>
-              <a:t>Consiste nel creare una rappresentazione del profilo del cliente ideale in modo tale comprendere meglio i suoi bisogni</a:t>
+              <a:t>Creare una rappresentazione del profilo del cliente ideale in modo tale comprendere meglio i suoi bisogni</a:t>
             </a:r>
           </a:p>
         </p:txBody>
@@ -12366,7 +12389,7 @@
                 </a:solidFill>
                 <a:latin typeface="Century Gothic" panose="020B0502020202020204" pitchFamily="34" charset="0"/>
               </a:rPr>
-              <a:t>Consiste nella gestione delle relazioni dei clienti al fine di rendere durature le relazioni con essi </a:t>
+              <a:t>Gestione delle relazioni dei clienti al fine di rendere durature le relazioni con essi </a:t>
             </a:r>
           </a:p>
         </p:txBody>
@@ -14100,7 +14123,7 @@
             <p:nvPr>
               <p:extLst>
                 <p:ext uri="{D42A27DB-BD31-4B8C-83A1-F6EECF244321}">
-                  <p14:modId xmlns:p14="http://schemas.microsoft.com/office/powerpoint/2010/main" val="3611330087"/>
+                  <p14:modId xmlns:p14="http://schemas.microsoft.com/office/powerpoint/2010/main" val="2445055529"/>
                 </p:ext>
               </p:extLst>
             </p:nvPr>
@@ -16803,7 +16826,7 @@
         </p:nvSpPr>
         <p:spPr>
           <a:xfrm>
-            <a:off x="2761539" y="527737"/>
+            <a:off x="2761539" y="667437"/>
             <a:ext cx="2337737" cy="369332"/>
           </a:xfrm>
           <a:prstGeom prst="rect">
@@ -16876,7 +16899,7 @@
         </p:nvSpPr>
         <p:spPr>
           <a:xfrm>
-            <a:off x="6763885" y="2295589"/>
+            <a:off x="6763885" y="2435289"/>
             <a:ext cx="652627" cy="369332"/>
           </a:xfrm>
           <a:prstGeom prst="rect">
@@ -16934,7 +16957,7 @@
         </p:blipFill>
         <p:spPr>
           <a:xfrm>
-            <a:off x="315300" y="862242"/>
+            <a:off x="315300" y="1001942"/>
             <a:ext cx="2185394" cy="1503173"/>
           </a:xfrm>
           <a:prstGeom prst="rect">
@@ -16956,7 +16979,7 @@
         </p:nvSpPr>
         <p:spPr>
           <a:xfrm>
-            <a:off x="6694605" y="2771581"/>
+            <a:off x="6694605" y="2911281"/>
             <a:ext cx="3056121" cy="1384995"/>
           </a:xfrm>
           <a:prstGeom prst="rect">
@@ -16999,7 +17022,7 @@
         </p:nvSpPr>
         <p:spPr>
           <a:xfrm>
-            <a:off x="2692264" y="1081721"/>
+            <a:off x="2692264" y="1221421"/>
             <a:ext cx="3056121" cy="1600438"/>
           </a:xfrm>
           <a:prstGeom prst="rect">
@@ -17054,7 +17077,7 @@
         </p:blipFill>
         <p:spPr>
           <a:xfrm>
-            <a:off x="10068927" y="2428469"/>
+            <a:off x="10068927" y="2568169"/>
             <a:ext cx="1670043" cy="1636642"/>
           </a:xfrm>
           <a:prstGeom prst="rect">
@@ -17076,7 +17099,7 @@
         </p:nvSpPr>
         <p:spPr>
           <a:xfrm>
-            <a:off x="1788800" y="4219123"/>
+            <a:off x="1788800" y="4358823"/>
             <a:ext cx="1311743" cy="369332"/>
           </a:xfrm>
           <a:prstGeom prst="rect">
@@ -17125,7 +17148,7 @@
         </p:nvSpPr>
         <p:spPr>
           <a:xfrm>
-            <a:off x="1719520" y="4695115"/>
+            <a:off x="1719520" y="4834815"/>
             <a:ext cx="3056121" cy="954107"/>
           </a:xfrm>
           <a:prstGeom prst="rect">
@@ -17175,7 +17198,7 @@
         </p:blipFill>
         <p:spPr>
           <a:xfrm>
-            <a:off x="4940290" y="4805190"/>
+            <a:off x="4940290" y="4944890"/>
             <a:ext cx="2227758" cy="943966"/>
           </a:xfrm>
           <a:prstGeom prst="rect">
@@ -17766,7 +17789,7 @@
         </p:blipFill>
         <p:spPr>
           <a:xfrm>
-            <a:off x="233845" y="1146765"/>
+            <a:off x="614845" y="1311865"/>
             <a:ext cx="1976232" cy="1721334"/>
           </a:xfrm>
           <a:prstGeom prst="rect">
@@ -17789,7 +17812,7 @@
         </p:nvSpPr>
         <p:spPr>
           <a:xfrm>
-            <a:off x="2210077" y="1146765"/>
+            <a:off x="2591077" y="1311865"/>
             <a:ext cx="2512226" cy="1877437"/>
           </a:xfrm>
           <a:prstGeom prst="rect">
@@ -18005,7 +18028,7 @@
         </p:blipFill>
         <p:spPr>
           <a:xfrm>
-            <a:off x="7809876" y="4401576"/>
+            <a:off x="7314576" y="4388876"/>
             <a:ext cx="3791715" cy="1949247"/>
           </a:xfrm>
           <a:prstGeom prst="rect">
@@ -18043,7 +18066,7 @@
         </p:blipFill>
         <p:spPr>
           <a:xfrm>
-            <a:off x="9057917" y="2880038"/>
+            <a:off x="8715017" y="2905438"/>
             <a:ext cx="3134083" cy="1949247"/>
           </a:xfrm>
           <a:prstGeom prst="rect">
@@ -18081,7 +18104,7 @@
         </p:blipFill>
         <p:spPr>
           <a:xfrm>
-            <a:off x="5163488" y="4149893"/>
+            <a:off x="4731688" y="4022893"/>
             <a:ext cx="2646388" cy="1645924"/>
           </a:xfrm>
           <a:prstGeom prst="rect">
@@ -18103,19 +18126,19 @@
         </p:nvSpPr>
         <p:spPr>
           <a:xfrm rot="5400000">
-            <a:off x="5804105" y="1539491"/>
+            <a:off x="5804105" y="1552191"/>
             <a:ext cx="1907982" cy="1324193"/>
           </a:xfrm>
           <a:prstGeom prst="bentArrow">
             <a:avLst>
-              <a:gd name="adj1" fmla="val 25000"/>
-              <a:gd name="adj2" fmla="val 25000"/>
-              <a:gd name="adj3" fmla="val 25000"/>
-              <a:gd name="adj4" fmla="val 46888"/>
+              <a:gd name="adj1" fmla="val 21163"/>
+              <a:gd name="adj2" fmla="val 25959"/>
+              <a:gd name="adj3" fmla="val 24041"/>
+              <a:gd name="adj4" fmla="val 48806"/>
             </a:avLst>
           </a:prstGeom>
           <a:noFill/>
-          <a:ln w="57150">
+          <a:ln w="38100">
             <a:solidFill>
               <a:schemeClr val="bg2">
                 <a:lumMod val="75000"/>
@@ -18166,7 +18189,7 @@
         </p:nvSpPr>
         <p:spPr>
           <a:xfrm>
-            <a:off x="9057917" y="2228761"/>
+            <a:off x="8715017" y="2190661"/>
             <a:ext cx="2543674" cy="369332"/>
           </a:xfrm>
           <a:prstGeom prst="rect">
@@ -18227,7 +18250,7 @@
         </p:nvSpPr>
         <p:spPr>
           <a:xfrm>
-            <a:off x="414010" y="261787"/>
+            <a:off x="795010" y="426887"/>
             <a:ext cx="2453881" cy="369332"/>
           </a:xfrm>
           <a:prstGeom prst="rect">
@@ -20435,7 +20458,7 @@
         <p:spPr>
           <a:xfrm>
             <a:off x="7923577" y="1020838"/>
-            <a:ext cx="2459426" cy="369332"/>
+            <a:ext cx="2608220" cy="369332"/>
           </a:xfrm>
           <a:prstGeom prst="rect">
             <a:avLst/>
@@ -20476,7 +20499,7 @@
                 </a:solidFill>
                 <a:latin typeface="Century Gothic" panose="020B0502020202020204" pitchFamily="34" charset="0"/>
               </a:rPr>
-              <a:t> accuracy</a:t>
+              <a:t> Accuracy</a:t>
             </a:r>
             <a:endParaRPr lang="it-IT" dirty="0">
               <a:solidFill>
@@ -21517,7 +21540,7 @@
       </p:sp>
       <p:sp>
         <p:nvSpPr>
-          <p:cNvPr id="12" name="Ovale 11">
+          <p:cNvPr id="12" name="Rettangolo con due angoli in diagonale ritagliati 11">
             <a:extLst>
               <a:ext uri="{FF2B5EF4-FFF2-40B4-BE49-F238E27FC236}">
                 <a16:creationId xmlns:a16="http://schemas.microsoft.com/office/drawing/2014/main" id="{39EEBA10-8EDC-8F4F-BD3D-1FE46251EF65}"/>
@@ -21529,16 +21552,16 @@
         </p:nvSpPr>
         <p:spPr>
           <a:xfrm>
-            <a:off x="625706" y="1828298"/>
-            <a:ext cx="2211321" cy="1943100"/>
+            <a:off x="862447" y="2026226"/>
+            <a:ext cx="2109663" cy="1600201"/>
           </a:xfrm>
-          <a:prstGeom prst="ellipse">
+          <a:prstGeom prst="snip2DiagRect">
             <a:avLst/>
           </a:prstGeom>
           <a:solidFill>
             <a:schemeClr val="accent4">
-              <a:lumMod val="20000"/>
-              <a:lumOff val="80000"/>
+              <a:lumMod val="40000"/>
+              <a:lumOff val="60000"/>
             </a:schemeClr>
           </a:solidFill>
           <a:ln>
@@ -21591,7 +21614,7 @@
         </p:nvSpPr>
         <p:spPr>
           <a:xfrm>
-            <a:off x="987989" y="2134498"/>
+            <a:off x="1123072" y="2134498"/>
             <a:ext cx="1603295" cy="461665"/>
           </a:xfrm>
           <a:prstGeom prst="rect">
@@ -21633,7 +21656,7 @@
         </p:nvGrpSpPr>
         <p:grpSpPr>
           <a:xfrm>
-            <a:off x="1379360" y="2745257"/>
+            <a:off x="1514443" y="2745257"/>
             <a:ext cx="691488" cy="675284"/>
             <a:chOff x="3859600" y="3591950"/>
             <a:chExt cx="296975" cy="296175"/>
@@ -22378,7 +22401,7 @@
       </p:grpSp>
       <p:sp>
         <p:nvSpPr>
-          <p:cNvPr id="56" name="Ovale 55">
+          <p:cNvPr id="56" name="Rettangolo con due angoli in diagonale ritagliati 55">
             <a:extLst>
               <a:ext uri="{FF2B5EF4-FFF2-40B4-BE49-F238E27FC236}">
                 <a16:creationId xmlns:a16="http://schemas.microsoft.com/office/drawing/2014/main" id="{A84CD818-3FEE-B04E-AB45-DA6E0D3CD7D2}"/>
@@ -22390,16 +22413,16 @@
         </p:nvSpPr>
         <p:spPr>
           <a:xfrm>
-            <a:off x="4938545" y="1885150"/>
-            <a:ext cx="2211321" cy="1943100"/>
+            <a:off x="5081767" y="2083078"/>
+            <a:ext cx="2109663" cy="1600201"/>
           </a:xfrm>
-          <a:prstGeom prst="ellipse">
+          <a:prstGeom prst="snip2DiagRect">
             <a:avLst/>
           </a:prstGeom>
           <a:solidFill>
             <a:schemeClr val="accent4">
-              <a:lumMod val="20000"/>
-              <a:lumOff val="80000"/>
+              <a:lumMod val="40000"/>
+              <a:lumOff val="60000"/>
             </a:schemeClr>
           </a:solidFill>
           <a:ln>
@@ -22452,7 +22475,7 @@
         </p:nvSpPr>
         <p:spPr>
           <a:xfrm>
-            <a:off x="5205406" y="2132330"/>
+            <a:off x="5263133" y="2132330"/>
             <a:ext cx="1779387" cy="461665"/>
           </a:xfrm>
           <a:prstGeom prst="rect">
@@ -22494,7 +22517,7 @@
         </p:nvGrpSpPr>
         <p:grpSpPr>
           <a:xfrm>
-            <a:off x="5645364" y="2760005"/>
+            <a:off x="5744954" y="2643247"/>
             <a:ext cx="783288" cy="699413"/>
             <a:chOff x="1687350" y="3618725"/>
             <a:chExt cx="270175" cy="295375"/>
@@ -23062,11 +23085,17 @@
         </p:nvGrpSpPr>
         <p:grpSpPr>
           <a:xfrm>
-            <a:off x="9167444" y="1828297"/>
-            <a:ext cx="2211321" cy="1943100"/>
+            <a:off x="9258711" y="2026225"/>
+            <a:ext cx="2109663" cy="1600201"/>
             <a:chOff x="8700977" y="2600640"/>
             <a:chExt cx="2627778" cy="2638625"/>
           </a:xfrm>
+          <a:solidFill>
+            <a:schemeClr val="accent4">
+              <a:lumMod val="40000"/>
+              <a:lumOff val="60000"/>
+            </a:schemeClr>
+          </a:solidFill>
         </p:grpSpPr>
         <p:sp>
           <p:nvSpPr>
@@ -23085,15 +23114,10 @@
               <a:off x="8700977" y="2600640"/>
               <a:ext cx="2627778" cy="2638625"/>
             </a:xfrm>
-            <a:prstGeom prst="ellipse">
+            <a:prstGeom prst="snip2DiagRect">
               <a:avLst/>
             </a:prstGeom>
-            <a:solidFill>
-              <a:schemeClr val="accent4">
-                <a:lumMod val="20000"/>
-                <a:lumOff val="80000"/>
-              </a:schemeClr>
-            </a:solidFill>
+            <a:grpFill/>
             <a:ln>
               <a:noFill/>
             </a:ln>
@@ -23144,12 +23168,13 @@
           </p:nvSpPr>
           <p:spPr>
             <a:xfrm>
-              <a:off x="9019887" y="3013500"/>
-              <a:ext cx="1989956" cy="626916"/>
+              <a:off x="8885880" y="2621992"/>
+              <a:ext cx="2257971" cy="908500"/>
             </a:xfrm>
-            <a:prstGeom prst="rect">
+            <a:prstGeom prst="snip2DiagRect">
               <a:avLst/>
             </a:prstGeom>
+            <a:grpFill/>
           </p:spPr>
           <p:txBody>
             <a:bodyPr wrap="square">
@@ -23169,202 +23194,6 @@
                 </a:rPr>
                 <a:t>Monetary</a:t>
               </a:r>
-            </a:p>
-          </p:txBody>
-        </p:sp>
-        <p:sp>
-          <p:nvSpPr>
-            <p:cNvPr id="81" name="Google Shape;6009;p70">
-              <a:extLst>
-                <a:ext uri="{FF2B5EF4-FFF2-40B4-BE49-F238E27FC236}">
-                  <a16:creationId xmlns:a16="http://schemas.microsoft.com/office/drawing/2014/main" id="{CD911D1D-1E5C-E34B-9702-84620269BC1A}"/>
-                </a:ext>
-              </a:extLst>
-            </p:cNvPr>
-            <p:cNvSpPr/>
-            <p:nvPr/>
-          </p:nvSpPr>
-          <p:spPr>
-            <a:xfrm>
-              <a:off x="9629550" y="3873209"/>
-              <a:ext cx="770632" cy="898542"/>
-            </a:xfrm>
-            <a:custGeom>
-              <a:avLst/>
-              <a:gdLst/>
-              <a:ahLst/>
-              <a:cxnLst/>
-              <a:rect l="l" t="t" r="r" b="b"/>
-              <a:pathLst>
-                <a:path w="12697" h="12666" extrusionOk="0">
-                  <a:moveTo>
-                    <a:pt x="6301" y="1356"/>
-                  </a:moveTo>
-                  <a:cubicBezTo>
-                    <a:pt x="6522" y="1356"/>
-                    <a:pt x="6711" y="1576"/>
-                    <a:pt x="6711" y="1797"/>
-                  </a:cubicBezTo>
-                  <a:lnTo>
-                    <a:pt x="6711" y="2269"/>
-                  </a:lnTo>
-                  <a:cubicBezTo>
-                    <a:pt x="7656" y="2458"/>
-                    <a:pt x="8349" y="3309"/>
-                    <a:pt x="8349" y="4285"/>
-                  </a:cubicBezTo>
-                  <a:cubicBezTo>
-                    <a:pt x="8349" y="4538"/>
-                    <a:pt x="8160" y="4727"/>
-                    <a:pt x="7971" y="4727"/>
-                  </a:cubicBezTo>
-                  <a:cubicBezTo>
-                    <a:pt x="7719" y="4727"/>
-                    <a:pt x="7530" y="4538"/>
-                    <a:pt x="7530" y="4285"/>
-                  </a:cubicBezTo>
-                  <a:cubicBezTo>
-                    <a:pt x="7530" y="3624"/>
-                    <a:pt x="6994" y="3057"/>
-                    <a:pt x="6301" y="3057"/>
-                  </a:cubicBezTo>
-                  <a:cubicBezTo>
-                    <a:pt x="5640" y="3057"/>
-                    <a:pt x="5073" y="3624"/>
-                    <a:pt x="5073" y="4285"/>
-                  </a:cubicBezTo>
-                  <a:cubicBezTo>
-                    <a:pt x="5073" y="4947"/>
-                    <a:pt x="5829" y="5483"/>
-                    <a:pt x="6585" y="6018"/>
-                  </a:cubicBezTo>
-                  <a:cubicBezTo>
-                    <a:pt x="7435" y="6648"/>
-                    <a:pt x="8412" y="7310"/>
-                    <a:pt x="8412" y="8413"/>
-                  </a:cubicBezTo>
-                  <a:cubicBezTo>
-                    <a:pt x="8412" y="9421"/>
-                    <a:pt x="7687" y="10271"/>
-                    <a:pt x="6742" y="10429"/>
-                  </a:cubicBezTo>
-                  <a:lnTo>
-                    <a:pt x="6742" y="10901"/>
-                  </a:lnTo>
-                  <a:cubicBezTo>
-                    <a:pt x="6742" y="11154"/>
-                    <a:pt x="6553" y="11311"/>
-                    <a:pt x="6364" y="11311"/>
-                  </a:cubicBezTo>
-                  <a:cubicBezTo>
-                    <a:pt x="6144" y="11311"/>
-                    <a:pt x="5955" y="11091"/>
-                    <a:pt x="5955" y="10901"/>
-                  </a:cubicBezTo>
-                  <a:lnTo>
-                    <a:pt x="5955" y="10429"/>
-                  </a:lnTo>
-                  <a:cubicBezTo>
-                    <a:pt x="5010" y="10240"/>
-                    <a:pt x="4316" y="9421"/>
-                    <a:pt x="4316" y="8413"/>
-                  </a:cubicBezTo>
-                  <a:cubicBezTo>
-                    <a:pt x="4316" y="8192"/>
-                    <a:pt x="4505" y="8035"/>
-                    <a:pt x="4694" y="8035"/>
-                  </a:cubicBezTo>
-                  <a:cubicBezTo>
-                    <a:pt x="4884" y="8035"/>
-                    <a:pt x="5136" y="8224"/>
-                    <a:pt x="5136" y="8413"/>
-                  </a:cubicBezTo>
-                  <a:cubicBezTo>
-                    <a:pt x="5136" y="9106"/>
-                    <a:pt x="5671" y="9641"/>
-                    <a:pt x="6364" y="9641"/>
-                  </a:cubicBezTo>
-                  <a:cubicBezTo>
-                    <a:pt x="7026" y="9641"/>
-                    <a:pt x="7561" y="9106"/>
-                    <a:pt x="7561" y="8413"/>
-                  </a:cubicBezTo>
-                  <a:cubicBezTo>
-                    <a:pt x="7561" y="7751"/>
-                    <a:pt x="6868" y="7247"/>
-                    <a:pt x="6081" y="6680"/>
-                  </a:cubicBezTo>
-                  <a:cubicBezTo>
-                    <a:pt x="5199" y="6050"/>
-                    <a:pt x="4253" y="5388"/>
-                    <a:pt x="4253" y="4285"/>
-                  </a:cubicBezTo>
-                  <a:cubicBezTo>
-                    <a:pt x="4253" y="3309"/>
-                    <a:pt x="4978" y="2427"/>
-                    <a:pt x="5923" y="2269"/>
-                  </a:cubicBezTo>
-                  <a:lnTo>
-                    <a:pt x="5923" y="1797"/>
-                  </a:lnTo>
-                  <a:cubicBezTo>
-                    <a:pt x="5923" y="1576"/>
-                    <a:pt x="6112" y="1356"/>
-                    <a:pt x="6301" y="1356"/>
-                  </a:cubicBezTo>
-                  <a:close/>
-                  <a:moveTo>
-                    <a:pt x="6333" y="1"/>
-                  </a:moveTo>
-                  <a:cubicBezTo>
-                    <a:pt x="2836" y="1"/>
-                    <a:pt x="0" y="2836"/>
-                    <a:pt x="0" y="6333"/>
-                  </a:cubicBezTo>
-                  <a:cubicBezTo>
-                    <a:pt x="0" y="9830"/>
-                    <a:pt x="2836" y="12666"/>
-                    <a:pt x="6333" y="12666"/>
-                  </a:cubicBezTo>
-                  <a:cubicBezTo>
-                    <a:pt x="9861" y="12666"/>
-                    <a:pt x="12697" y="9830"/>
-                    <a:pt x="12697" y="6333"/>
-                  </a:cubicBezTo>
-                  <a:cubicBezTo>
-                    <a:pt x="12697" y="2836"/>
-                    <a:pt x="9861" y="1"/>
-                    <a:pt x="6333" y="1"/>
-                  </a:cubicBezTo>
-                  <a:close/>
-                </a:path>
-              </a:pathLst>
-            </a:custGeom>
-            <a:solidFill>
-              <a:schemeClr val="accent3">
-                <a:lumMod val="75000"/>
-              </a:schemeClr>
-            </a:solidFill>
-            <a:ln>
-              <a:noFill/>
-            </a:ln>
-          </p:spPr>
-          <p:txBody>
-            <a:bodyPr spcFirstLastPara="1" wrap="square" lIns="91425" tIns="91425" rIns="91425" bIns="91425" anchor="ctr" anchorCtr="0">
-              <a:noAutofit/>
-            </a:bodyPr>
-            <a:lstStyle/>
-            <a:p>
-              <a:pPr marL="0" lvl="0" indent="0" algn="l" rtl="0">
-                <a:spcBef>
-                  <a:spcPts val="0"/>
-                </a:spcBef>
-                <a:spcAft>
-                  <a:spcPts val="0"/>
-                </a:spcAft>
-                <a:buNone/>
-              </a:pPr>
-              <a:endParaRPr/>
             </a:p>
           </p:txBody>
         </p:sp>
@@ -23399,7 +23228,7 @@
         </p:blipFill>
         <p:spPr>
           <a:xfrm>
-            <a:off x="4316653" y="4105128"/>
+            <a:off x="4378999" y="4105128"/>
             <a:ext cx="3628776" cy="2256922"/>
           </a:xfrm>
           <a:prstGeom prst="rect">
@@ -23437,7 +23266,7 @@
         </p:blipFill>
         <p:spPr>
           <a:xfrm>
-            <a:off x="8391758" y="4009922"/>
+            <a:off x="8464495" y="4009922"/>
             <a:ext cx="3628776" cy="2256922"/>
           </a:xfrm>
           <a:prstGeom prst="rect">
@@ -23445,6 +23274,202 @@
           </a:prstGeom>
         </p:spPr>
       </p:pic>
+      <p:sp>
+        <p:nvSpPr>
+          <p:cNvPr id="28" name="Google Shape;6009;p70">
+            <a:extLst>
+              <a:ext uri="{FF2B5EF4-FFF2-40B4-BE49-F238E27FC236}">
+                <a16:creationId xmlns:a16="http://schemas.microsoft.com/office/drawing/2014/main" id="{C994DE54-91AB-3F47-B52C-999A7CD74964}"/>
+              </a:ext>
+            </a:extLst>
+          </p:cNvPr>
+          <p:cNvSpPr/>
+          <p:nvPr/>
+        </p:nvSpPr>
+        <p:spPr>
+          <a:xfrm>
+            <a:off x="9989292" y="2622687"/>
+            <a:ext cx="648500" cy="661692"/>
+          </a:xfrm>
+          <a:custGeom>
+            <a:avLst/>
+            <a:gdLst/>
+            <a:ahLst/>
+            <a:cxnLst/>
+            <a:rect l="l" t="t" r="r" b="b"/>
+            <a:pathLst>
+              <a:path w="12697" h="12666" extrusionOk="0">
+                <a:moveTo>
+                  <a:pt x="6301" y="1356"/>
+                </a:moveTo>
+                <a:cubicBezTo>
+                  <a:pt x="6522" y="1356"/>
+                  <a:pt x="6711" y="1576"/>
+                  <a:pt x="6711" y="1797"/>
+                </a:cubicBezTo>
+                <a:lnTo>
+                  <a:pt x="6711" y="2269"/>
+                </a:lnTo>
+                <a:cubicBezTo>
+                  <a:pt x="7656" y="2458"/>
+                  <a:pt x="8349" y="3309"/>
+                  <a:pt x="8349" y="4285"/>
+                </a:cubicBezTo>
+                <a:cubicBezTo>
+                  <a:pt x="8349" y="4538"/>
+                  <a:pt x="8160" y="4727"/>
+                  <a:pt x="7971" y="4727"/>
+                </a:cubicBezTo>
+                <a:cubicBezTo>
+                  <a:pt x="7719" y="4727"/>
+                  <a:pt x="7530" y="4538"/>
+                  <a:pt x="7530" y="4285"/>
+                </a:cubicBezTo>
+                <a:cubicBezTo>
+                  <a:pt x="7530" y="3624"/>
+                  <a:pt x="6994" y="3057"/>
+                  <a:pt x="6301" y="3057"/>
+                </a:cubicBezTo>
+                <a:cubicBezTo>
+                  <a:pt x="5640" y="3057"/>
+                  <a:pt x="5073" y="3624"/>
+                  <a:pt x="5073" y="4285"/>
+                </a:cubicBezTo>
+                <a:cubicBezTo>
+                  <a:pt x="5073" y="4947"/>
+                  <a:pt x="5829" y="5483"/>
+                  <a:pt x="6585" y="6018"/>
+                </a:cubicBezTo>
+                <a:cubicBezTo>
+                  <a:pt x="7435" y="6648"/>
+                  <a:pt x="8412" y="7310"/>
+                  <a:pt x="8412" y="8413"/>
+                </a:cubicBezTo>
+                <a:cubicBezTo>
+                  <a:pt x="8412" y="9421"/>
+                  <a:pt x="7687" y="10271"/>
+                  <a:pt x="6742" y="10429"/>
+                </a:cubicBezTo>
+                <a:lnTo>
+                  <a:pt x="6742" y="10901"/>
+                </a:lnTo>
+                <a:cubicBezTo>
+                  <a:pt x="6742" y="11154"/>
+                  <a:pt x="6553" y="11311"/>
+                  <a:pt x="6364" y="11311"/>
+                </a:cubicBezTo>
+                <a:cubicBezTo>
+                  <a:pt x="6144" y="11311"/>
+                  <a:pt x="5955" y="11091"/>
+                  <a:pt x="5955" y="10901"/>
+                </a:cubicBezTo>
+                <a:lnTo>
+                  <a:pt x="5955" y="10429"/>
+                </a:lnTo>
+                <a:cubicBezTo>
+                  <a:pt x="5010" y="10240"/>
+                  <a:pt x="4316" y="9421"/>
+                  <a:pt x="4316" y="8413"/>
+                </a:cubicBezTo>
+                <a:cubicBezTo>
+                  <a:pt x="4316" y="8192"/>
+                  <a:pt x="4505" y="8035"/>
+                  <a:pt x="4694" y="8035"/>
+                </a:cubicBezTo>
+                <a:cubicBezTo>
+                  <a:pt x="4884" y="8035"/>
+                  <a:pt x="5136" y="8224"/>
+                  <a:pt x="5136" y="8413"/>
+                </a:cubicBezTo>
+                <a:cubicBezTo>
+                  <a:pt x="5136" y="9106"/>
+                  <a:pt x="5671" y="9641"/>
+                  <a:pt x="6364" y="9641"/>
+                </a:cubicBezTo>
+                <a:cubicBezTo>
+                  <a:pt x="7026" y="9641"/>
+                  <a:pt x="7561" y="9106"/>
+                  <a:pt x="7561" y="8413"/>
+                </a:cubicBezTo>
+                <a:cubicBezTo>
+                  <a:pt x="7561" y="7751"/>
+                  <a:pt x="6868" y="7247"/>
+                  <a:pt x="6081" y="6680"/>
+                </a:cubicBezTo>
+                <a:cubicBezTo>
+                  <a:pt x="5199" y="6050"/>
+                  <a:pt x="4253" y="5388"/>
+                  <a:pt x="4253" y="4285"/>
+                </a:cubicBezTo>
+                <a:cubicBezTo>
+                  <a:pt x="4253" y="3309"/>
+                  <a:pt x="4978" y="2427"/>
+                  <a:pt x="5923" y="2269"/>
+                </a:cubicBezTo>
+                <a:lnTo>
+                  <a:pt x="5923" y="1797"/>
+                </a:lnTo>
+                <a:cubicBezTo>
+                  <a:pt x="5923" y="1576"/>
+                  <a:pt x="6112" y="1356"/>
+                  <a:pt x="6301" y="1356"/>
+                </a:cubicBezTo>
+                <a:close/>
+                <a:moveTo>
+                  <a:pt x="6333" y="1"/>
+                </a:moveTo>
+                <a:cubicBezTo>
+                  <a:pt x="2836" y="1"/>
+                  <a:pt x="0" y="2836"/>
+                  <a:pt x="0" y="6333"/>
+                </a:cubicBezTo>
+                <a:cubicBezTo>
+                  <a:pt x="0" y="9830"/>
+                  <a:pt x="2836" y="12666"/>
+                  <a:pt x="6333" y="12666"/>
+                </a:cubicBezTo>
+                <a:cubicBezTo>
+                  <a:pt x="9861" y="12666"/>
+                  <a:pt x="12697" y="9830"/>
+                  <a:pt x="12697" y="6333"/>
+                </a:cubicBezTo>
+                <a:cubicBezTo>
+                  <a:pt x="12697" y="2836"/>
+                  <a:pt x="9861" y="1"/>
+                  <a:pt x="6333" y="1"/>
+                </a:cubicBezTo>
+                <a:close/>
+              </a:path>
+            </a:pathLst>
+          </a:custGeom>
+          <a:solidFill>
+            <a:schemeClr val="accent3">
+              <a:lumMod val="75000"/>
+            </a:schemeClr>
+          </a:solidFill>
+          <a:ln>
+            <a:noFill/>
+          </a:ln>
+        </p:spPr>
+        <p:txBody>
+          <a:bodyPr spcFirstLastPara="1" wrap="square" lIns="91425" tIns="91425" rIns="91425" bIns="91425" anchor="ctr" anchorCtr="0">
+            <a:noAutofit/>
+          </a:bodyPr>
+          <a:lstStyle/>
+          <a:p>
+            <a:pPr marL="0" lvl="0" indent="0" algn="l" rtl="0">
+              <a:spcBef>
+                <a:spcPts val="0"/>
+              </a:spcBef>
+              <a:spcAft>
+                <a:spcPts val="0"/>
+              </a:spcAft>
+              <a:buNone/>
+            </a:pPr>
+            <a:endParaRPr/>
+          </a:p>
+        </p:txBody>
+      </p:sp>
     </p:spTree>
     <p:extLst>
       <p:ext uri="{BB962C8B-B14F-4D97-AF65-F5344CB8AC3E}">

</xml_diff>